<commit_message>
[오자현] ppt, pdf 수정
</commit_message>
<xml_diff>
--- a/23VCPP_기말요약_수정.pptx
+++ b/23VCPP_기말요약_수정.pptx
@@ -1033,406 +1033,6 @@
     </pc:docChg>
   </pc:docChgLst>
   <pc:docChgLst>
-    <pc:chgData name="은석 이" userId="af18d81f-601b-4b8c-ae0d-605950137b83" providerId="ADAL" clId="{83A934BC-8347-447D-821F-274EB4778878}"/>
-    <pc:docChg chg="undo custSel addSld delSld modSld sldOrd addSection delSection modSection">
-      <pc:chgData name="은석 이" userId="af18d81f-601b-4b8c-ae0d-605950137b83" providerId="ADAL" clId="{83A934BC-8347-447D-821F-274EB4778878}" dt="2022-03-09T00:00:20.026" v="66"/>
-      <pc:docMkLst>
-        <pc:docMk/>
-      </pc:docMkLst>
-      <pc:sldChg chg="modSp mod">
-        <pc:chgData name="은석 이" userId="af18d81f-601b-4b8c-ae0d-605950137b83" providerId="ADAL" clId="{83A934BC-8347-447D-821F-274EB4778878}" dt="2022-03-08T22:11:26.177" v="12" actId="20577"/>
-        <pc:sldMkLst>
-          <pc:docMk/>
-          <pc:sldMk cId="300797553" sldId="256"/>
-        </pc:sldMkLst>
-        <pc:spChg chg="mod">
-          <ac:chgData name="은석 이" userId="af18d81f-601b-4b8c-ae0d-605950137b83" providerId="ADAL" clId="{83A934BC-8347-447D-821F-274EB4778878}" dt="2022-03-08T22:11:26.177" v="12" actId="20577"/>
-          <ac:spMkLst>
-            <pc:docMk/>
-            <pc:sldMk cId="300797553" sldId="256"/>
-            <ac:spMk id="26" creationId="{00000000-0000-0000-0000-000000000000}"/>
-          </ac:spMkLst>
-        </pc:spChg>
-      </pc:sldChg>
-      <pc:sldChg chg="ord">
-        <pc:chgData name="은석 이" userId="af18d81f-601b-4b8c-ae0d-605950137b83" providerId="ADAL" clId="{83A934BC-8347-447D-821F-274EB4778878}" dt="2022-03-08T23:07:40.754" v="44"/>
-        <pc:sldMkLst>
-          <pc:docMk/>
-          <pc:sldMk cId="4209906439" sldId="401"/>
-        </pc:sldMkLst>
-      </pc:sldChg>
-      <pc:sldChg chg="ord">
-        <pc:chgData name="은석 이" userId="af18d81f-601b-4b8c-ae0d-605950137b83" providerId="ADAL" clId="{83A934BC-8347-447D-821F-274EB4778878}" dt="2022-03-08T23:07:40.754" v="44"/>
-        <pc:sldMkLst>
-          <pc:docMk/>
-          <pc:sldMk cId="4159576815" sldId="402"/>
-        </pc:sldMkLst>
-      </pc:sldChg>
-      <pc:sldChg chg="ord">
-        <pc:chgData name="은석 이" userId="af18d81f-601b-4b8c-ae0d-605950137b83" providerId="ADAL" clId="{83A934BC-8347-447D-821F-274EB4778878}" dt="2022-03-08T23:07:40.754" v="44"/>
-        <pc:sldMkLst>
-          <pc:docMk/>
-          <pc:sldMk cId="2884637848" sldId="403"/>
-        </pc:sldMkLst>
-      </pc:sldChg>
-      <pc:sldChg chg="ord">
-        <pc:chgData name="은석 이" userId="af18d81f-601b-4b8c-ae0d-605950137b83" providerId="ADAL" clId="{83A934BC-8347-447D-821F-274EB4778878}" dt="2022-03-08T23:07:40.754" v="44"/>
-        <pc:sldMkLst>
-          <pc:docMk/>
-          <pc:sldMk cId="1352520872" sldId="404"/>
-        </pc:sldMkLst>
-      </pc:sldChg>
-      <pc:sldChg chg="ord">
-        <pc:chgData name="은석 이" userId="af18d81f-601b-4b8c-ae0d-605950137b83" providerId="ADAL" clId="{83A934BC-8347-447D-821F-274EB4778878}" dt="2022-03-08T23:07:40.754" v="44"/>
-        <pc:sldMkLst>
-          <pc:docMk/>
-          <pc:sldMk cId="2497707455" sldId="405"/>
-        </pc:sldMkLst>
-      </pc:sldChg>
-      <pc:sldChg chg="ord">
-        <pc:chgData name="은석 이" userId="af18d81f-601b-4b8c-ae0d-605950137b83" providerId="ADAL" clId="{83A934BC-8347-447D-821F-274EB4778878}" dt="2022-03-08T23:07:40.754" v="44"/>
-        <pc:sldMkLst>
-          <pc:docMk/>
-          <pc:sldMk cId="3575296601" sldId="406"/>
-        </pc:sldMkLst>
-      </pc:sldChg>
-      <pc:sldChg chg="ord">
-        <pc:chgData name="은석 이" userId="af18d81f-601b-4b8c-ae0d-605950137b83" providerId="ADAL" clId="{83A934BC-8347-447D-821F-274EB4778878}" dt="2022-03-08T23:07:40.754" v="44"/>
-        <pc:sldMkLst>
-          <pc:docMk/>
-          <pc:sldMk cId="3913042801" sldId="407"/>
-        </pc:sldMkLst>
-      </pc:sldChg>
-      <pc:sldChg chg="del ord">
-        <pc:chgData name="은석 이" userId="af18d81f-601b-4b8c-ae0d-605950137b83" providerId="ADAL" clId="{83A934BC-8347-447D-821F-274EB4778878}" dt="2022-03-08T22:12:55.337" v="31" actId="47"/>
-        <pc:sldMkLst>
-          <pc:docMk/>
-          <pc:sldMk cId="2315695313" sldId="408"/>
-        </pc:sldMkLst>
-      </pc:sldChg>
-      <pc:sldChg chg="ord">
-        <pc:chgData name="은석 이" userId="af18d81f-601b-4b8c-ae0d-605950137b83" providerId="ADAL" clId="{83A934BC-8347-447D-821F-274EB4778878}" dt="2022-03-08T23:07:40.754" v="44"/>
-        <pc:sldMkLst>
-          <pc:docMk/>
-          <pc:sldMk cId="1013437712" sldId="409"/>
-        </pc:sldMkLst>
-      </pc:sldChg>
-      <pc:sldChg chg="ord">
-        <pc:chgData name="은석 이" userId="af18d81f-601b-4b8c-ae0d-605950137b83" providerId="ADAL" clId="{83A934BC-8347-447D-821F-274EB4778878}" dt="2022-03-08T23:07:40.754" v="44"/>
-        <pc:sldMkLst>
-          <pc:docMk/>
-          <pc:sldMk cId="682015973" sldId="410"/>
-        </pc:sldMkLst>
-      </pc:sldChg>
-      <pc:sldChg chg="ord">
-        <pc:chgData name="은석 이" userId="af18d81f-601b-4b8c-ae0d-605950137b83" providerId="ADAL" clId="{83A934BC-8347-447D-821F-274EB4778878}" dt="2022-03-08T23:07:40.754" v="44"/>
-        <pc:sldMkLst>
-          <pc:docMk/>
-          <pc:sldMk cId="1482040522" sldId="411"/>
-        </pc:sldMkLst>
-      </pc:sldChg>
-      <pc:sldChg chg="ord">
-        <pc:chgData name="은석 이" userId="af18d81f-601b-4b8c-ae0d-605950137b83" providerId="ADAL" clId="{83A934BC-8347-447D-821F-274EB4778878}" dt="2022-03-08T23:07:40.754" v="44"/>
-        <pc:sldMkLst>
-          <pc:docMk/>
-          <pc:sldMk cId="1244834494" sldId="412"/>
-        </pc:sldMkLst>
-      </pc:sldChg>
-      <pc:sldChg chg="modSp add mod">
-        <pc:chgData name="은석 이" userId="af18d81f-601b-4b8c-ae0d-605950137b83" providerId="ADAL" clId="{83A934BC-8347-447D-821F-274EB4778878}" dt="2022-03-08T22:11:41.513" v="28" actId="403"/>
-        <pc:sldMkLst>
-          <pc:docMk/>
-          <pc:sldMk cId="3532888796" sldId="429"/>
-        </pc:sldMkLst>
-        <pc:spChg chg="mod">
-          <ac:chgData name="은석 이" userId="af18d81f-601b-4b8c-ae0d-605950137b83" providerId="ADAL" clId="{83A934BC-8347-447D-821F-274EB4778878}" dt="2022-03-08T22:11:41.513" v="28" actId="403"/>
-          <ac:spMkLst>
-            <pc:docMk/>
-            <pc:sldMk cId="3532888796" sldId="429"/>
-            <ac:spMk id="26" creationId="{00000000-0000-0000-0000-000000000000}"/>
-          </ac:spMkLst>
-        </pc:spChg>
-      </pc:sldChg>
-      <pc:sldChg chg="add">
-        <pc:chgData name="은석 이" userId="af18d81f-601b-4b8c-ae0d-605950137b83" providerId="ADAL" clId="{83A934BC-8347-447D-821F-274EB4778878}" dt="2022-03-08T22:25:28.267" v="32"/>
-        <pc:sldMkLst>
-          <pc:docMk/>
-          <pc:sldMk cId="2521215017" sldId="450"/>
-        </pc:sldMkLst>
-      </pc:sldChg>
-      <pc:sldChg chg="modSp add mod">
-        <pc:chgData name="은석 이" userId="af18d81f-601b-4b8c-ae0d-605950137b83" providerId="ADAL" clId="{83A934BC-8347-447D-821F-274EB4778878}" dt="2022-03-08T22:25:39.229" v="34" actId="122"/>
-        <pc:sldMkLst>
-          <pc:docMk/>
-          <pc:sldMk cId="737675764" sldId="451"/>
-        </pc:sldMkLst>
-        <pc:spChg chg="mod">
-          <ac:chgData name="은석 이" userId="af18d81f-601b-4b8c-ae0d-605950137b83" providerId="ADAL" clId="{83A934BC-8347-447D-821F-274EB4778878}" dt="2022-03-08T22:25:39.229" v="34" actId="122"/>
-          <ac:spMkLst>
-            <pc:docMk/>
-            <pc:sldMk cId="737675764" sldId="451"/>
-            <ac:spMk id="2" creationId="{00000000-0000-0000-0000-000000000000}"/>
-          </ac:spMkLst>
-        </pc:spChg>
-      </pc:sldChg>
-      <pc:sldChg chg="add">
-        <pc:chgData name="은석 이" userId="af18d81f-601b-4b8c-ae0d-605950137b83" providerId="ADAL" clId="{83A934BC-8347-447D-821F-274EB4778878}" dt="2022-03-08T22:25:28.267" v="32"/>
-        <pc:sldMkLst>
-          <pc:docMk/>
-          <pc:sldMk cId="4115012928" sldId="452"/>
-        </pc:sldMkLst>
-      </pc:sldChg>
-      <pc:sldChg chg="add">
-        <pc:chgData name="은석 이" userId="af18d81f-601b-4b8c-ae0d-605950137b83" providerId="ADAL" clId="{83A934BC-8347-447D-821F-274EB4778878}" dt="2022-03-08T22:25:28.267" v="32"/>
-        <pc:sldMkLst>
-          <pc:docMk/>
-          <pc:sldMk cId="3353829144" sldId="453"/>
-        </pc:sldMkLst>
-      </pc:sldChg>
-      <pc:sldChg chg="add">
-        <pc:chgData name="은석 이" userId="af18d81f-601b-4b8c-ae0d-605950137b83" providerId="ADAL" clId="{83A934BC-8347-447D-821F-274EB4778878}" dt="2022-03-08T22:25:28.267" v="32"/>
-        <pc:sldMkLst>
-          <pc:docMk/>
-          <pc:sldMk cId="1240547419" sldId="456"/>
-        </pc:sldMkLst>
-      </pc:sldChg>
-      <pc:sldChg chg="delSp modSp add mod">
-        <pc:chgData name="은석 이" userId="af18d81f-601b-4b8c-ae0d-605950137b83" providerId="ADAL" clId="{83A934BC-8347-447D-821F-274EB4778878}" dt="2022-03-08T22:39:01.767" v="39" actId="122"/>
-        <pc:sldMkLst>
-          <pc:docMk/>
-          <pc:sldMk cId="2675685187" sldId="457"/>
-        </pc:sldMkLst>
-        <pc:spChg chg="mod">
-          <ac:chgData name="은석 이" userId="af18d81f-601b-4b8c-ae0d-605950137b83" providerId="ADAL" clId="{83A934BC-8347-447D-821F-274EB4778878}" dt="2022-03-08T22:39:01.767" v="39" actId="122"/>
-          <ac:spMkLst>
-            <pc:docMk/>
-            <pc:sldMk cId="2675685187" sldId="457"/>
-            <ac:spMk id="2" creationId="{00000000-0000-0000-0000-000000000000}"/>
-          </ac:spMkLst>
-        </pc:spChg>
-        <pc:spChg chg="del">
-          <ac:chgData name="은석 이" userId="af18d81f-601b-4b8c-ae0d-605950137b83" providerId="ADAL" clId="{83A934BC-8347-447D-821F-274EB4778878}" dt="2022-03-08T22:38:56.989" v="37" actId="478"/>
-          <ac:spMkLst>
-            <pc:docMk/>
-            <pc:sldMk cId="2675685187" sldId="457"/>
-            <ac:spMk id="3" creationId="{00000000-0000-0000-0000-000000000000}"/>
-          </ac:spMkLst>
-        </pc:spChg>
-      </pc:sldChg>
-      <pc:sldChg chg="add">
-        <pc:chgData name="은석 이" userId="af18d81f-601b-4b8c-ae0d-605950137b83" providerId="ADAL" clId="{83A934BC-8347-447D-821F-274EB4778878}" dt="2022-03-08T22:25:28.267" v="32"/>
-        <pc:sldMkLst>
-          <pc:docMk/>
-          <pc:sldMk cId="429643234" sldId="460"/>
-        </pc:sldMkLst>
-      </pc:sldChg>
-      <pc:sldChg chg="add">
-        <pc:chgData name="은석 이" userId="af18d81f-601b-4b8c-ae0d-605950137b83" providerId="ADAL" clId="{83A934BC-8347-447D-821F-274EB4778878}" dt="2022-03-08T22:25:28.267" v="32"/>
-        <pc:sldMkLst>
-          <pc:docMk/>
-          <pc:sldMk cId="4201205876" sldId="461"/>
-        </pc:sldMkLst>
-      </pc:sldChg>
-      <pc:sldChg chg="add">
-        <pc:chgData name="은석 이" userId="af18d81f-601b-4b8c-ae0d-605950137b83" providerId="ADAL" clId="{83A934BC-8347-447D-821F-274EB4778878}" dt="2022-03-08T22:25:28.267" v="32"/>
-        <pc:sldMkLst>
-          <pc:docMk/>
-          <pc:sldMk cId="733751911" sldId="462"/>
-        </pc:sldMkLst>
-      </pc:sldChg>
-      <pc:sldChg chg="add">
-        <pc:chgData name="은석 이" userId="af18d81f-601b-4b8c-ae0d-605950137b83" providerId="ADAL" clId="{83A934BC-8347-447D-821F-274EB4778878}" dt="2022-03-08T22:25:28.267" v="32"/>
-        <pc:sldMkLst>
-          <pc:docMk/>
-          <pc:sldMk cId="1981030800" sldId="463"/>
-        </pc:sldMkLst>
-      </pc:sldChg>
-      <pc:sldChg chg="add">
-        <pc:chgData name="은석 이" userId="af18d81f-601b-4b8c-ae0d-605950137b83" providerId="ADAL" clId="{83A934BC-8347-447D-821F-274EB4778878}" dt="2022-03-08T22:25:28.267" v="32"/>
-        <pc:sldMkLst>
-          <pc:docMk/>
-          <pc:sldMk cId="568060623" sldId="464"/>
-        </pc:sldMkLst>
-      </pc:sldChg>
-      <pc:sldChg chg="add">
-        <pc:chgData name="은석 이" userId="af18d81f-601b-4b8c-ae0d-605950137b83" providerId="ADAL" clId="{83A934BC-8347-447D-821F-274EB4778878}" dt="2022-03-08T23:44:51.980" v="53"/>
-        <pc:sldMkLst>
-          <pc:docMk/>
-          <pc:sldMk cId="1453470010" sldId="469"/>
-        </pc:sldMkLst>
-      </pc:sldChg>
-      <pc:sldChg chg="modSp add mod">
-        <pc:chgData name="은석 이" userId="af18d81f-601b-4b8c-ae0d-605950137b83" providerId="ADAL" clId="{83A934BC-8347-447D-821F-274EB4778878}" dt="2022-03-08T22:30:43.696" v="36" actId="27636"/>
-        <pc:sldMkLst>
-          <pc:docMk/>
-          <pc:sldMk cId="624297585" sldId="492"/>
-        </pc:sldMkLst>
-        <pc:spChg chg="mod">
-          <ac:chgData name="은석 이" userId="af18d81f-601b-4b8c-ae0d-605950137b83" providerId="ADAL" clId="{83A934BC-8347-447D-821F-274EB4778878}" dt="2022-03-08T22:30:43.696" v="36" actId="27636"/>
-          <ac:spMkLst>
-            <pc:docMk/>
-            <pc:sldMk cId="624297585" sldId="492"/>
-            <ac:spMk id="2" creationId="{48179B75-3A63-4998-BD10-6FD92D31F978}"/>
-          </ac:spMkLst>
-        </pc:spChg>
-      </pc:sldChg>
-      <pc:sldChg chg="modSp add mod">
-        <pc:chgData name="은석 이" userId="af18d81f-601b-4b8c-ae0d-605950137b83" providerId="ADAL" clId="{83A934BC-8347-447D-821F-274EB4778878}" dt="2022-03-08T23:06:40.616" v="42" actId="20577"/>
-        <pc:sldMkLst>
-          <pc:docMk/>
-          <pc:sldMk cId="3829078166" sldId="493"/>
-        </pc:sldMkLst>
-        <pc:spChg chg="mod">
-          <ac:chgData name="은석 이" userId="af18d81f-601b-4b8c-ae0d-605950137b83" providerId="ADAL" clId="{83A934BC-8347-447D-821F-274EB4778878}" dt="2022-03-08T23:06:40.616" v="42" actId="20577"/>
-          <ac:spMkLst>
-            <pc:docMk/>
-            <pc:sldMk cId="3829078166" sldId="493"/>
-            <ac:spMk id="2" creationId="{00000000-0000-0000-0000-000000000000}"/>
-          </ac:spMkLst>
-        </pc:spChg>
-      </pc:sldChg>
-      <pc:sldChg chg="addSp delSp modSp new mod">
-        <pc:chgData name="은석 이" userId="af18d81f-601b-4b8c-ae0d-605950137b83" providerId="ADAL" clId="{83A934BC-8347-447D-821F-274EB4778878}" dt="2022-03-08T23:20:43.724" v="52" actId="14100"/>
-        <pc:sldMkLst>
-          <pc:docMk/>
-          <pc:sldMk cId="3851787363" sldId="494"/>
-        </pc:sldMkLst>
-        <pc:spChg chg="del">
-          <ac:chgData name="은석 이" userId="af18d81f-601b-4b8c-ae0d-605950137b83" providerId="ADAL" clId="{83A934BC-8347-447D-821F-274EB4778878}" dt="2022-03-08T23:20:38.919" v="49" actId="478"/>
-          <ac:spMkLst>
-            <pc:docMk/>
-            <pc:sldMk cId="3851787363" sldId="494"/>
-            <ac:spMk id="2" creationId="{3B7AD16D-5D44-4C96-AD49-5ED3DAC7594A}"/>
-          </ac:spMkLst>
-        </pc:spChg>
-        <pc:spChg chg="del">
-          <ac:chgData name="은석 이" userId="af18d81f-601b-4b8c-ae0d-605950137b83" providerId="ADAL" clId="{83A934BC-8347-447D-821F-274EB4778878}" dt="2022-03-08T23:20:39.720" v="50" actId="478"/>
-          <ac:spMkLst>
-            <pc:docMk/>
-            <pc:sldMk cId="3851787363" sldId="494"/>
-            <ac:spMk id="3" creationId="{C60F1C30-44DF-473E-A483-7E2C08E4E5A1}"/>
-          </ac:spMkLst>
-        </pc:spChg>
-        <pc:picChg chg="add mod">
-          <ac:chgData name="은석 이" userId="af18d81f-601b-4b8c-ae0d-605950137b83" providerId="ADAL" clId="{83A934BC-8347-447D-821F-274EB4778878}" dt="2022-03-08T23:20:43.724" v="52" actId="14100"/>
-          <ac:picMkLst>
-            <pc:docMk/>
-            <pc:sldMk cId="3851787363" sldId="494"/>
-            <ac:picMk id="5" creationId="{9C678A0B-8E1D-4D17-8ED2-C48A3113D1D1}"/>
-          </ac:picMkLst>
-        </pc:picChg>
-      </pc:sldChg>
-      <pc:sldChg chg="modSp add mod">
-        <pc:chgData name="은석 이" userId="af18d81f-601b-4b8c-ae0d-605950137b83" providerId="ADAL" clId="{83A934BC-8347-447D-821F-274EB4778878}" dt="2022-03-08T23:45:00.513" v="62"/>
-        <pc:sldMkLst>
-          <pc:docMk/>
-          <pc:sldMk cId="4056567219" sldId="495"/>
-        </pc:sldMkLst>
-        <pc:spChg chg="mod">
-          <ac:chgData name="은석 이" userId="af18d81f-601b-4b8c-ae0d-605950137b83" providerId="ADAL" clId="{83A934BC-8347-447D-821F-274EB4778878}" dt="2022-03-08T23:45:00.513" v="62"/>
-          <ac:spMkLst>
-            <pc:docMk/>
-            <pc:sldMk cId="4056567219" sldId="495"/>
-            <ac:spMk id="2" creationId="{962DF4A1-EE14-45CD-B10E-B70C27DF1277}"/>
-          </ac:spMkLst>
-        </pc:spChg>
-      </pc:sldChg>
-      <pc:sldChg chg="add">
-        <pc:chgData name="은석 이" userId="af18d81f-601b-4b8c-ae0d-605950137b83" providerId="ADAL" clId="{83A934BC-8347-447D-821F-274EB4778878}" dt="2022-03-08T23:44:51.980" v="53"/>
-        <pc:sldMkLst>
-          <pc:docMk/>
-          <pc:sldMk cId="4256211787" sldId="496"/>
-        </pc:sldMkLst>
-      </pc:sldChg>
-      <pc:sldChg chg="modSp add mod">
-        <pc:chgData name="은석 이" userId="af18d81f-601b-4b8c-ae0d-605950137b83" providerId="ADAL" clId="{83A934BC-8347-447D-821F-274EB4778878}" dt="2022-03-08T23:48:27.798" v="64" actId="14100"/>
-        <pc:sldMkLst>
-          <pc:docMk/>
-          <pc:sldMk cId="2253604571" sldId="497"/>
-        </pc:sldMkLst>
-        <pc:picChg chg="mod">
-          <ac:chgData name="은석 이" userId="af18d81f-601b-4b8c-ae0d-605950137b83" providerId="ADAL" clId="{83A934BC-8347-447D-821F-274EB4778878}" dt="2022-03-08T23:48:27.798" v="64" actId="14100"/>
-          <ac:picMkLst>
-            <pc:docMk/>
-            <pc:sldMk cId="2253604571" sldId="497"/>
-            <ac:picMk id="6" creationId="{E73F57C3-559B-42D4-B09B-7E812F6F33B6}"/>
-          </ac:picMkLst>
-        </pc:picChg>
-      </pc:sldChg>
-      <pc:sldChg chg="add">
-        <pc:chgData name="은석 이" userId="af18d81f-601b-4b8c-ae0d-605950137b83" providerId="ADAL" clId="{83A934BC-8347-447D-821F-274EB4778878}" dt="2022-03-08T23:44:51.980" v="53"/>
-        <pc:sldMkLst>
-          <pc:docMk/>
-          <pc:sldMk cId="883481190" sldId="498"/>
-        </pc:sldMkLst>
-      </pc:sldChg>
-      <pc:sldChg chg="add ord">
-        <pc:chgData name="은석 이" userId="af18d81f-601b-4b8c-ae0d-605950137b83" providerId="ADAL" clId="{83A934BC-8347-447D-821F-274EB4778878}" dt="2022-03-09T00:00:20.026" v="66"/>
-        <pc:sldMkLst>
-          <pc:docMk/>
-          <pc:sldMk cId="2556904549" sldId="499"/>
-        </pc:sldMkLst>
-      </pc:sldChg>
-      <pc:sldChg chg="add">
-        <pc:chgData name="은석 이" userId="af18d81f-601b-4b8c-ae0d-605950137b83" providerId="ADAL" clId="{83A934BC-8347-447D-821F-274EB4778878}" dt="2022-03-08T23:44:51.980" v="53"/>
-        <pc:sldMkLst>
-          <pc:docMk/>
-          <pc:sldMk cId="1364893366" sldId="500"/>
-        </pc:sldMkLst>
-      </pc:sldChg>
-      <pc:sldChg chg="add">
-        <pc:chgData name="은석 이" userId="af18d81f-601b-4b8c-ae0d-605950137b83" providerId="ADAL" clId="{83A934BC-8347-447D-821F-274EB4778878}" dt="2022-03-08T23:44:51.980" v="53"/>
-        <pc:sldMkLst>
-          <pc:docMk/>
-          <pc:sldMk cId="3463893001" sldId="501"/>
-        </pc:sldMkLst>
-      </pc:sldChg>
-      <pc:sldChg chg="add">
-        <pc:chgData name="은석 이" userId="af18d81f-601b-4b8c-ae0d-605950137b83" providerId="ADAL" clId="{83A934BC-8347-447D-821F-274EB4778878}" dt="2022-03-08T23:44:51.980" v="53"/>
-        <pc:sldMkLst>
-          <pc:docMk/>
-          <pc:sldMk cId="895740198" sldId="502"/>
-        </pc:sldMkLst>
-      </pc:sldChg>
-      <pc:sldChg chg="add">
-        <pc:chgData name="은석 이" userId="af18d81f-601b-4b8c-ae0d-605950137b83" providerId="ADAL" clId="{83A934BC-8347-447D-821F-274EB4778878}" dt="2022-03-08T23:44:51.980" v="53"/>
-        <pc:sldMkLst>
-          <pc:docMk/>
-          <pc:sldMk cId="4246068820" sldId="503"/>
-        </pc:sldMkLst>
-      </pc:sldChg>
-      <pc:sldChg chg="modSp add mod">
-        <pc:chgData name="은석 이" userId="af18d81f-601b-4b8c-ae0d-605950137b83" providerId="ADAL" clId="{83A934BC-8347-447D-821F-274EB4778878}" dt="2022-03-08T23:44:52.092" v="54" actId="27636"/>
-        <pc:sldMkLst>
-          <pc:docMk/>
-          <pc:sldMk cId="4052239147" sldId="504"/>
-        </pc:sldMkLst>
-        <pc:spChg chg="mod">
-          <ac:chgData name="은석 이" userId="af18d81f-601b-4b8c-ae0d-605950137b83" providerId="ADAL" clId="{83A934BC-8347-447D-821F-274EB4778878}" dt="2022-03-08T23:44:52.092" v="54" actId="27636"/>
-          <ac:spMkLst>
-            <pc:docMk/>
-            <pc:sldMk cId="4052239147" sldId="504"/>
-            <ac:spMk id="2" creationId="{BE491E90-3742-41B6-913E-51A62122AEF7}"/>
-          </ac:spMkLst>
-        </pc:spChg>
-      </pc:sldChg>
-      <pc:sldChg chg="add">
-        <pc:chgData name="은석 이" userId="af18d81f-601b-4b8c-ae0d-605950137b83" providerId="ADAL" clId="{83A934BC-8347-447D-821F-274EB4778878}" dt="2022-03-08T23:44:51.980" v="53"/>
-        <pc:sldMkLst>
-          <pc:docMk/>
-          <pc:sldMk cId="4036689438" sldId="505"/>
-        </pc:sldMkLst>
-      </pc:sldChg>
-      <pc:sldChg chg="add">
-        <pc:chgData name="은석 이" userId="af18d81f-601b-4b8c-ae0d-605950137b83" providerId="ADAL" clId="{83A934BC-8347-447D-821F-274EB4778878}" dt="2022-03-08T23:44:51.980" v="53"/>
-        <pc:sldMkLst>
-          <pc:docMk/>
-          <pc:sldMk cId="4198410787" sldId="506"/>
-        </pc:sldMkLst>
-      </pc:sldChg>
-    </pc:docChg>
-  </pc:docChgLst>
-  <pc:docChgLst>
     <pc:chgData name="은석 이" userId="af18d81f-601b-4b8c-ae0d-605950137b83" providerId="ADAL" clId="{2A389893-E4E4-4222-943A-2ACB80F82C94}"/>
     <pc:docChg chg="undo custSel addSld delSld modSld sldOrd">
       <pc:chgData name="은석 이" userId="af18d81f-601b-4b8c-ae0d-605950137b83" providerId="ADAL" clId="{2A389893-E4E4-4222-943A-2ACB80F82C94}" dt="2021-09-14T00:55:33.137" v="433" actId="20577"/>
@@ -1845,6 +1445,406 @@
             <ac:spMk id="2" creationId="{00000000-0000-0000-0000-000000000000}"/>
           </ac:spMkLst>
         </pc:spChg>
+      </pc:sldChg>
+    </pc:docChg>
+  </pc:docChgLst>
+  <pc:docChgLst>
+    <pc:chgData name="은석 이" userId="af18d81f-601b-4b8c-ae0d-605950137b83" providerId="ADAL" clId="{83A934BC-8347-447D-821F-274EB4778878}"/>
+    <pc:docChg chg="undo custSel addSld delSld modSld sldOrd addSection delSection modSection">
+      <pc:chgData name="은석 이" userId="af18d81f-601b-4b8c-ae0d-605950137b83" providerId="ADAL" clId="{83A934BC-8347-447D-821F-274EB4778878}" dt="2022-03-09T00:00:20.026" v="66"/>
+      <pc:docMkLst>
+        <pc:docMk/>
+      </pc:docMkLst>
+      <pc:sldChg chg="modSp mod">
+        <pc:chgData name="은석 이" userId="af18d81f-601b-4b8c-ae0d-605950137b83" providerId="ADAL" clId="{83A934BC-8347-447D-821F-274EB4778878}" dt="2022-03-08T22:11:26.177" v="12" actId="20577"/>
+        <pc:sldMkLst>
+          <pc:docMk/>
+          <pc:sldMk cId="300797553" sldId="256"/>
+        </pc:sldMkLst>
+        <pc:spChg chg="mod">
+          <ac:chgData name="은석 이" userId="af18d81f-601b-4b8c-ae0d-605950137b83" providerId="ADAL" clId="{83A934BC-8347-447D-821F-274EB4778878}" dt="2022-03-08T22:11:26.177" v="12" actId="20577"/>
+          <ac:spMkLst>
+            <pc:docMk/>
+            <pc:sldMk cId="300797553" sldId="256"/>
+            <ac:spMk id="26" creationId="{00000000-0000-0000-0000-000000000000}"/>
+          </ac:spMkLst>
+        </pc:spChg>
+      </pc:sldChg>
+      <pc:sldChg chg="ord">
+        <pc:chgData name="은석 이" userId="af18d81f-601b-4b8c-ae0d-605950137b83" providerId="ADAL" clId="{83A934BC-8347-447D-821F-274EB4778878}" dt="2022-03-08T23:07:40.754" v="44"/>
+        <pc:sldMkLst>
+          <pc:docMk/>
+          <pc:sldMk cId="4209906439" sldId="401"/>
+        </pc:sldMkLst>
+      </pc:sldChg>
+      <pc:sldChg chg="ord">
+        <pc:chgData name="은석 이" userId="af18d81f-601b-4b8c-ae0d-605950137b83" providerId="ADAL" clId="{83A934BC-8347-447D-821F-274EB4778878}" dt="2022-03-08T23:07:40.754" v="44"/>
+        <pc:sldMkLst>
+          <pc:docMk/>
+          <pc:sldMk cId="4159576815" sldId="402"/>
+        </pc:sldMkLst>
+      </pc:sldChg>
+      <pc:sldChg chg="ord">
+        <pc:chgData name="은석 이" userId="af18d81f-601b-4b8c-ae0d-605950137b83" providerId="ADAL" clId="{83A934BC-8347-447D-821F-274EB4778878}" dt="2022-03-08T23:07:40.754" v="44"/>
+        <pc:sldMkLst>
+          <pc:docMk/>
+          <pc:sldMk cId="2884637848" sldId="403"/>
+        </pc:sldMkLst>
+      </pc:sldChg>
+      <pc:sldChg chg="ord">
+        <pc:chgData name="은석 이" userId="af18d81f-601b-4b8c-ae0d-605950137b83" providerId="ADAL" clId="{83A934BC-8347-447D-821F-274EB4778878}" dt="2022-03-08T23:07:40.754" v="44"/>
+        <pc:sldMkLst>
+          <pc:docMk/>
+          <pc:sldMk cId="1352520872" sldId="404"/>
+        </pc:sldMkLst>
+      </pc:sldChg>
+      <pc:sldChg chg="ord">
+        <pc:chgData name="은석 이" userId="af18d81f-601b-4b8c-ae0d-605950137b83" providerId="ADAL" clId="{83A934BC-8347-447D-821F-274EB4778878}" dt="2022-03-08T23:07:40.754" v="44"/>
+        <pc:sldMkLst>
+          <pc:docMk/>
+          <pc:sldMk cId="2497707455" sldId="405"/>
+        </pc:sldMkLst>
+      </pc:sldChg>
+      <pc:sldChg chg="ord">
+        <pc:chgData name="은석 이" userId="af18d81f-601b-4b8c-ae0d-605950137b83" providerId="ADAL" clId="{83A934BC-8347-447D-821F-274EB4778878}" dt="2022-03-08T23:07:40.754" v="44"/>
+        <pc:sldMkLst>
+          <pc:docMk/>
+          <pc:sldMk cId="3575296601" sldId="406"/>
+        </pc:sldMkLst>
+      </pc:sldChg>
+      <pc:sldChg chg="ord">
+        <pc:chgData name="은석 이" userId="af18d81f-601b-4b8c-ae0d-605950137b83" providerId="ADAL" clId="{83A934BC-8347-447D-821F-274EB4778878}" dt="2022-03-08T23:07:40.754" v="44"/>
+        <pc:sldMkLst>
+          <pc:docMk/>
+          <pc:sldMk cId="3913042801" sldId="407"/>
+        </pc:sldMkLst>
+      </pc:sldChg>
+      <pc:sldChg chg="del ord">
+        <pc:chgData name="은석 이" userId="af18d81f-601b-4b8c-ae0d-605950137b83" providerId="ADAL" clId="{83A934BC-8347-447D-821F-274EB4778878}" dt="2022-03-08T22:12:55.337" v="31" actId="47"/>
+        <pc:sldMkLst>
+          <pc:docMk/>
+          <pc:sldMk cId="2315695313" sldId="408"/>
+        </pc:sldMkLst>
+      </pc:sldChg>
+      <pc:sldChg chg="ord">
+        <pc:chgData name="은석 이" userId="af18d81f-601b-4b8c-ae0d-605950137b83" providerId="ADAL" clId="{83A934BC-8347-447D-821F-274EB4778878}" dt="2022-03-08T23:07:40.754" v="44"/>
+        <pc:sldMkLst>
+          <pc:docMk/>
+          <pc:sldMk cId="1013437712" sldId="409"/>
+        </pc:sldMkLst>
+      </pc:sldChg>
+      <pc:sldChg chg="ord">
+        <pc:chgData name="은석 이" userId="af18d81f-601b-4b8c-ae0d-605950137b83" providerId="ADAL" clId="{83A934BC-8347-447D-821F-274EB4778878}" dt="2022-03-08T23:07:40.754" v="44"/>
+        <pc:sldMkLst>
+          <pc:docMk/>
+          <pc:sldMk cId="682015973" sldId="410"/>
+        </pc:sldMkLst>
+      </pc:sldChg>
+      <pc:sldChg chg="ord">
+        <pc:chgData name="은석 이" userId="af18d81f-601b-4b8c-ae0d-605950137b83" providerId="ADAL" clId="{83A934BC-8347-447D-821F-274EB4778878}" dt="2022-03-08T23:07:40.754" v="44"/>
+        <pc:sldMkLst>
+          <pc:docMk/>
+          <pc:sldMk cId="1482040522" sldId="411"/>
+        </pc:sldMkLst>
+      </pc:sldChg>
+      <pc:sldChg chg="ord">
+        <pc:chgData name="은석 이" userId="af18d81f-601b-4b8c-ae0d-605950137b83" providerId="ADAL" clId="{83A934BC-8347-447D-821F-274EB4778878}" dt="2022-03-08T23:07:40.754" v="44"/>
+        <pc:sldMkLst>
+          <pc:docMk/>
+          <pc:sldMk cId="1244834494" sldId="412"/>
+        </pc:sldMkLst>
+      </pc:sldChg>
+      <pc:sldChg chg="modSp add mod">
+        <pc:chgData name="은석 이" userId="af18d81f-601b-4b8c-ae0d-605950137b83" providerId="ADAL" clId="{83A934BC-8347-447D-821F-274EB4778878}" dt="2022-03-08T22:11:41.513" v="28" actId="403"/>
+        <pc:sldMkLst>
+          <pc:docMk/>
+          <pc:sldMk cId="3532888796" sldId="429"/>
+        </pc:sldMkLst>
+        <pc:spChg chg="mod">
+          <ac:chgData name="은석 이" userId="af18d81f-601b-4b8c-ae0d-605950137b83" providerId="ADAL" clId="{83A934BC-8347-447D-821F-274EB4778878}" dt="2022-03-08T22:11:41.513" v="28" actId="403"/>
+          <ac:spMkLst>
+            <pc:docMk/>
+            <pc:sldMk cId="3532888796" sldId="429"/>
+            <ac:spMk id="26" creationId="{00000000-0000-0000-0000-000000000000}"/>
+          </ac:spMkLst>
+        </pc:spChg>
+      </pc:sldChg>
+      <pc:sldChg chg="add">
+        <pc:chgData name="은석 이" userId="af18d81f-601b-4b8c-ae0d-605950137b83" providerId="ADAL" clId="{83A934BC-8347-447D-821F-274EB4778878}" dt="2022-03-08T22:25:28.267" v="32"/>
+        <pc:sldMkLst>
+          <pc:docMk/>
+          <pc:sldMk cId="2521215017" sldId="450"/>
+        </pc:sldMkLst>
+      </pc:sldChg>
+      <pc:sldChg chg="modSp add mod">
+        <pc:chgData name="은석 이" userId="af18d81f-601b-4b8c-ae0d-605950137b83" providerId="ADAL" clId="{83A934BC-8347-447D-821F-274EB4778878}" dt="2022-03-08T22:25:39.229" v="34" actId="122"/>
+        <pc:sldMkLst>
+          <pc:docMk/>
+          <pc:sldMk cId="737675764" sldId="451"/>
+        </pc:sldMkLst>
+        <pc:spChg chg="mod">
+          <ac:chgData name="은석 이" userId="af18d81f-601b-4b8c-ae0d-605950137b83" providerId="ADAL" clId="{83A934BC-8347-447D-821F-274EB4778878}" dt="2022-03-08T22:25:39.229" v="34" actId="122"/>
+          <ac:spMkLst>
+            <pc:docMk/>
+            <pc:sldMk cId="737675764" sldId="451"/>
+            <ac:spMk id="2" creationId="{00000000-0000-0000-0000-000000000000}"/>
+          </ac:spMkLst>
+        </pc:spChg>
+      </pc:sldChg>
+      <pc:sldChg chg="add">
+        <pc:chgData name="은석 이" userId="af18d81f-601b-4b8c-ae0d-605950137b83" providerId="ADAL" clId="{83A934BC-8347-447D-821F-274EB4778878}" dt="2022-03-08T22:25:28.267" v="32"/>
+        <pc:sldMkLst>
+          <pc:docMk/>
+          <pc:sldMk cId="4115012928" sldId="452"/>
+        </pc:sldMkLst>
+      </pc:sldChg>
+      <pc:sldChg chg="add">
+        <pc:chgData name="은석 이" userId="af18d81f-601b-4b8c-ae0d-605950137b83" providerId="ADAL" clId="{83A934BC-8347-447D-821F-274EB4778878}" dt="2022-03-08T22:25:28.267" v="32"/>
+        <pc:sldMkLst>
+          <pc:docMk/>
+          <pc:sldMk cId="3353829144" sldId="453"/>
+        </pc:sldMkLst>
+      </pc:sldChg>
+      <pc:sldChg chg="add">
+        <pc:chgData name="은석 이" userId="af18d81f-601b-4b8c-ae0d-605950137b83" providerId="ADAL" clId="{83A934BC-8347-447D-821F-274EB4778878}" dt="2022-03-08T22:25:28.267" v="32"/>
+        <pc:sldMkLst>
+          <pc:docMk/>
+          <pc:sldMk cId="1240547419" sldId="456"/>
+        </pc:sldMkLst>
+      </pc:sldChg>
+      <pc:sldChg chg="delSp modSp add mod">
+        <pc:chgData name="은석 이" userId="af18d81f-601b-4b8c-ae0d-605950137b83" providerId="ADAL" clId="{83A934BC-8347-447D-821F-274EB4778878}" dt="2022-03-08T22:39:01.767" v="39" actId="122"/>
+        <pc:sldMkLst>
+          <pc:docMk/>
+          <pc:sldMk cId="2675685187" sldId="457"/>
+        </pc:sldMkLst>
+        <pc:spChg chg="mod">
+          <ac:chgData name="은석 이" userId="af18d81f-601b-4b8c-ae0d-605950137b83" providerId="ADAL" clId="{83A934BC-8347-447D-821F-274EB4778878}" dt="2022-03-08T22:39:01.767" v="39" actId="122"/>
+          <ac:spMkLst>
+            <pc:docMk/>
+            <pc:sldMk cId="2675685187" sldId="457"/>
+            <ac:spMk id="2" creationId="{00000000-0000-0000-0000-000000000000}"/>
+          </ac:spMkLst>
+        </pc:spChg>
+        <pc:spChg chg="del">
+          <ac:chgData name="은석 이" userId="af18d81f-601b-4b8c-ae0d-605950137b83" providerId="ADAL" clId="{83A934BC-8347-447D-821F-274EB4778878}" dt="2022-03-08T22:38:56.989" v="37" actId="478"/>
+          <ac:spMkLst>
+            <pc:docMk/>
+            <pc:sldMk cId="2675685187" sldId="457"/>
+            <ac:spMk id="3" creationId="{00000000-0000-0000-0000-000000000000}"/>
+          </ac:spMkLst>
+        </pc:spChg>
+      </pc:sldChg>
+      <pc:sldChg chg="add">
+        <pc:chgData name="은석 이" userId="af18d81f-601b-4b8c-ae0d-605950137b83" providerId="ADAL" clId="{83A934BC-8347-447D-821F-274EB4778878}" dt="2022-03-08T22:25:28.267" v="32"/>
+        <pc:sldMkLst>
+          <pc:docMk/>
+          <pc:sldMk cId="429643234" sldId="460"/>
+        </pc:sldMkLst>
+      </pc:sldChg>
+      <pc:sldChg chg="add">
+        <pc:chgData name="은석 이" userId="af18d81f-601b-4b8c-ae0d-605950137b83" providerId="ADAL" clId="{83A934BC-8347-447D-821F-274EB4778878}" dt="2022-03-08T22:25:28.267" v="32"/>
+        <pc:sldMkLst>
+          <pc:docMk/>
+          <pc:sldMk cId="4201205876" sldId="461"/>
+        </pc:sldMkLst>
+      </pc:sldChg>
+      <pc:sldChg chg="add">
+        <pc:chgData name="은석 이" userId="af18d81f-601b-4b8c-ae0d-605950137b83" providerId="ADAL" clId="{83A934BC-8347-447D-821F-274EB4778878}" dt="2022-03-08T22:25:28.267" v="32"/>
+        <pc:sldMkLst>
+          <pc:docMk/>
+          <pc:sldMk cId="733751911" sldId="462"/>
+        </pc:sldMkLst>
+      </pc:sldChg>
+      <pc:sldChg chg="add">
+        <pc:chgData name="은석 이" userId="af18d81f-601b-4b8c-ae0d-605950137b83" providerId="ADAL" clId="{83A934BC-8347-447D-821F-274EB4778878}" dt="2022-03-08T22:25:28.267" v="32"/>
+        <pc:sldMkLst>
+          <pc:docMk/>
+          <pc:sldMk cId="1981030800" sldId="463"/>
+        </pc:sldMkLst>
+      </pc:sldChg>
+      <pc:sldChg chg="add">
+        <pc:chgData name="은석 이" userId="af18d81f-601b-4b8c-ae0d-605950137b83" providerId="ADAL" clId="{83A934BC-8347-447D-821F-274EB4778878}" dt="2022-03-08T22:25:28.267" v="32"/>
+        <pc:sldMkLst>
+          <pc:docMk/>
+          <pc:sldMk cId="568060623" sldId="464"/>
+        </pc:sldMkLst>
+      </pc:sldChg>
+      <pc:sldChg chg="add">
+        <pc:chgData name="은석 이" userId="af18d81f-601b-4b8c-ae0d-605950137b83" providerId="ADAL" clId="{83A934BC-8347-447D-821F-274EB4778878}" dt="2022-03-08T23:44:51.980" v="53"/>
+        <pc:sldMkLst>
+          <pc:docMk/>
+          <pc:sldMk cId="1453470010" sldId="469"/>
+        </pc:sldMkLst>
+      </pc:sldChg>
+      <pc:sldChg chg="modSp add mod">
+        <pc:chgData name="은석 이" userId="af18d81f-601b-4b8c-ae0d-605950137b83" providerId="ADAL" clId="{83A934BC-8347-447D-821F-274EB4778878}" dt="2022-03-08T22:30:43.696" v="36" actId="27636"/>
+        <pc:sldMkLst>
+          <pc:docMk/>
+          <pc:sldMk cId="624297585" sldId="492"/>
+        </pc:sldMkLst>
+        <pc:spChg chg="mod">
+          <ac:chgData name="은석 이" userId="af18d81f-601b-4b8c-ae0d-605950137b83" providerId="ADAL" clId="{83A934BC-8347-447D-821F-274EB4778878}" dt="2022-03-08T22:30:43.696" v="36" actId="27636"/>
+          <ac:spMkLst>
+            <pc:docMk/>
+            <pc:sldMk cId="624297585" sldId="492"/>
+            <ac:spMk id="2" creationId="{48179B75-3A63-4998-BD10-6FD92D31F978}"/>
+          </ac:spMkLst>
+        </pc:spChg>
+      </pc:sldChg>
+      <pc:sldChg chg="modSp add mod">
+        <pc:chgData name="은석 이" userId="af18d81f-601b-4b8c-ae0d-605950137b83" providerId="ADAL" clId="{83A934BC-8347-447D-821F-274EB4778878}" dt="2022-03-08T23:06:40.616" v="42" actId="20577"/>
+        <pc:sldMkLst>
+          <pc:docMk/>
+          <pc:sldMk cId="3829078166" sldId="493"/>
+        </pc:sldMkLst>
+        <pc:spChg chg="mod">
+          <ac:chgData name="은석 이" userId="af18d81f-601b-4b8c-ae0d-605950137b83" providerId="ADAL" clId="{83A934BC-8347-447D-821F-274EB4778878}" dt="2022-03-08T23:06:40.616" v="42" actId="20577"/>
+          <ac:spMkLst>
+            <pc:docMk/>
+            <pc:sldMk cId="3829078166" sldId="493"/>
+            <ac:spMk id="2" creationId="{00000000-0000-0000-0000-000000000000}"/>
+          </ac:spMkLst>
+        </pc:spChg>
+      </pc:sldChg>
+      <pc:sldChg chg="addSp delSp modSp new mod">
+        <pc:chgData name="은석 이" userId="af18d81f-601b-4b8c-ae0d-605950137b83" providerId="ADAL" clId="{83A934BC-8347-447D-821F-274EB4778878}" dt="2022-03-08T23:20:43.724" v="52" actId="14100"/>
+        <pc:sldMkLst>
+          <pc:docMk/>
+          <pc:sldMk cId="3851787363" sldId="494"/>
+        </pc:sldMkLst>
+        <pc:spChg chg="del">
+          <ac:chgData name="은석 이" userId="af18d81f-601b-4b8c-ae0d-605950137b83" providerId="ADAL" clId="{83A934BC-8347-447D-821F-274EB4778878}" dt="2022-03-08T23:20:38.919" v="49" actId="478"/>
+          <ac:spMkLst>
+            <pc:docMk/>
+            <pc:sldMk cId="3851787363" sldId="494"/>
+            <ac:spMk id="2" creationId="{3B7AD16D-5D44-4C96-AD49-5ED3DAC7594A}"/>
+          </ac:spMkLst>
+        </pc:spChg>
+        <pc:spChg chg="del">
+          <ac:chgData name="은석 이" userId="af18d81f-601b-4b8c-ae0d-605950137b83" providerId="ADAL" clId="{83A934BC-8347-447D-821F-274EB4778878}" dt="2022-03-08T23:20:39.720" v="50" actId="478"/>
+          <ac:spMkLst>
+            <pc:docMk/>
+            <pc:sldMk cId="3851787363" sldId="494"/>
+            <ac:spMk id="3" creationId="{C60F1C30-44DF-473E-A483-7E2C08E4E5A1}"/>
+          </ac:spMkLst>
+        </pc:spChg>
+        <pc:picChg chg="add mod">
+          <ac:chgData name="은석 이" userId="af18d81f-601b-4b8c-ae0d-605950137b83" providerId="ADAL" clId="{83A934BC-8347-447D-821F-274EB4778878}" dt="2022-03-08T23:20:43.724" v="52" actId="14100"/>
+          <ac:picMkLst>
+            <pc:docMk/>
+            <pc:sldMk cId="3851787363" sldId="494"/>
+            <ac:picMk id="5" creationId="{9C678A0B-8E1D-4D17-8ED2-C48A3113D1D1}"/>
+          </ac:picMkLst>
+        </pc:picChg>
+      </pc:sldChg>
+      <pc:sldChg chg="modSp add mod">
+        <pc:chgData name="은석 이" userId="af18d81f-601b-4b8c-ae0d-605950137b83" providerId="ADAL" clId="{83A934BC-8347-447D-821F-274EB4778878}" dt="2022-03-08T23:45:00.513" v="62"/>
+        <pc:sldMkLst>
+          <pc:docMk/>
+          <pc:sldMk cId="4056567219" sldId="495"/>
+        </pc:sldMkLst>
+        <pc:spChg chg="mod">
+          <ac:chgData name="은석 이" userId="af18d81f-601b-4b8c-ae0d-605950137b83" providerId="ADAL" clId="{83A934BC-8347-447D-821F-274EB4778878}" dt="2022-03-08T23:45:00.513" v="62"/>
+          <ac:spMkLst>
+            <pc:docMk/>
+            <pc:sldMk cId="4056567219" sldId="495"/>
+            <ac:spMk id="2" creationId="{962DF4A1-EE14-45CD-B10E-B70C27DF1277}"/>
+          </ac:spMkLst>
+        </pc:spChg>
+      </pc:sldChg>
+      <pc:sldChg chg="add">
+        <pc:chgData name="은석 이" userId="af18d81f-601b-4b8c-ae0d-605950137b83" providerId="ADAL" clId="{83A934BC-8347-447D-821F-274EB4778878}" dt="2022-03-08T23:44:51.980" v="53"/>
+        <pc:sldMkLst>
+          <pc:docMk/>
+          <pc:sldMk cId="4256211787" sldId="496"/>
+        </pc:sldMkLst>
+      </pc:sldChg>
+      <pc:sldChg chg="modSp add mod">
+        <pc:chgData name="은석 이" userId="af18d81f-601b-4b8c-ae0d-605950137b83" providerId="ADAL" clId="{83A934BC-8347-447D-821F-274EB4778878}" dt="2022-03-08T23:48:27.798" v="64" actId="14100"/>
+        <pc:sldMkLst>
+          <pc:docMk/>
+          <pc:sldMk cId="2253604571" sldId="497"/>
+        </pc:sldMkLst>
+        <pc:picChg chg="mod">
+          <ac:chgData name="은석 이" userId="af18d81f-601b-4b8c-ae0d-605950137b83" providerId="ADAL" clId="{83A934BC-8347-447D-821F-274EB4778878}" dt="2022-03-08T23:48:27.798" v="64" actId="14100"/>
+          <ac:picMkLst>
+            <pc:docMk/>
+            <pc:sldMk cId="2253604571" sldId="497"/>
+            <ac:picMk id="6" creationId="{E73F57C3-559B-42D4-B09B-7E812F6F33B6}"/>
+          </ac:picMkLst>
+        </pc:picChg>
+      </pc:sldChg>
+      <pc:sldChg chg="add">
+        <pc:chgData name="은석 이" userId="af18d81f-601b-4b8c-ae0d-605950137b83" providerId="ADAL" clId="{83A934BC-8347-447D-821F-274EB4778878}" dt="2022-03-08T23:44:51.980" v="53"/>
+        <pc:sldMkLst>
+          <pc:docMk/>
+          <pc:sldMk cId="883481190" sldId="498"/>
+        </pc:sldMkLst>
+      </pc:sldChg>
+      <pc:sldChg chg="add ord">
+        <pc:chgData name="은석 이" userId="af18d81f-601b-4b8c-ae0d-605950137b83" providerId="ADAL" clId="{83A934BC-8347-447D-821F-274EB4778878}" dt="2022-03-09T00:00:20.026" v="66"/>
+        <pc:sldMkLst>
+          <pc:docMk/>
+          <pc:sldMk cId="2556904549" sldId="499"/>
+        </pc:sldMkLst>
+      </pc:sldChg>
+      <pc:sldChg chg="add">
+        <pc:chgData name="은석 이" userId="af18d81f-601b-4b8c-ae0d-605950137b83" providerId="ADAL" clId="{83A934BC-8347-447D-821F-274EB4778878}" dt="2022-03-08T23:44:51.980" v="53"/>
+        <pc:sldMkLst>
+          <pc:docMk/>
+          <pc:sldMk cId="1364893366" sldId="500"/>
+        </pc:sldMkLst>
+      </pc:sldChg>
+      <pc:sldChg chg="add">
+        <pc:chgData name="은석 이" userId="af18d81f-601b-4b8c-ae0d-605950137b83" providerId="ADAL" clId="{83A934BC-8347-447D-821F-274EB4778878}" dt="2022-03-08T23:44:51.980" v="53"/>
+        <pc:sldMkLst>
+          <pc:docMk/>
+          <pc:sldMk cId="3463893001" sldId="501"/>
+        </pc:sldMkLst>
+      </pc:sldChg>
+      <pc:sldChg chg="add">
+        <pc:chgData name="은석 이" userId="af18d81f-601b-4b8c-ae0d-605950137b83" providerId="ADAL" clId="{83A934BC-8347-447D-821F-274EB4778878}" dt="2022-03-08T23:44:51.980" v="53"/>
+        <pc:sldMkLst>
+          <pc:docMk/>
+          <pc:sldMk cId="895740198" sldId="502"/>
+        </pc:sldMkLst>
+      </pc:sldChg>
+      <pc:sldChg chg="add">
+        <pc:chgData name="은석 이" userId="af18d81f-601b-4b8c-ae0d-605950137b83" providerId="ADAL" clId="{83A934BC-8347-447D-821F-274EB4778878}" dt="2022-03-08T23:44:51.980" v="53"/>
+        <pc:sldMkLst>
+          <pc:docMk/>
+          <pc:sldMk cId="4246068820" sldId="503"/>
+        </pc:sldMkLst>
+      </pc:sldChg>
+      <pc:sldChg chg="modSp add mod">
+        <pc:chgData name="은석 이" userId="af18d81f-601b-4b8c-ae0d-605950137b83" providerId="ADAL" clId="{83A934BC-8347-447D-821F-274EB4778878}" dt="2022-03-08T23:44:52.092" v="54" actId="27636"/>
+        <pc:sldMkLst>
+          <pc:docMk/>
+          <pc:sldMk cId="4052239147" sldId="504"/>
+        </pc:sldMkLst>
+        <pc:spChg chg="mod">
+          <ac:chgData name="은석 이" userId="af18d81f-601b-4b8c-ae0d-605950137b83" providerId="ADAL" clId="{83A934BC-8347-447D-821F-274EB4778878}" dt="2022-03-08T23:44:52.092" v="54" actId="27636"/>
+          <ac:spMkLst>
+            <pc:docMk/>
+            <pc:sldMk cId="4052239147" sldId="504"/>
+            <ac:spMk id="2" creationId="{BE491E90-3742-41B6-913E-51A62122AEF7}"/>
+          </ac:spMkLst>
+        </pc:spChg>
+      </pc:sldChg>
+      <pc:sldChg chg="add">
+        <pc:chgData name="은석 이" userId="af18d81f-601b-4b8c-ae0d-605950137b83" providerId="ADAL" clId="{83A934BC-8347-447D-821F-274EB4778878}" dt="2022-03-08T23:44:51.980" v="53"/>
+        <pc:sldMkLst>
+          <pc:docMk/>
+          <pc:sldMk cId="4036689438" sldId="505"/>
+        </pc:sldMkLst>
+      </pc:sldChg>
+      <pc:sldChg chg="add">
+        <pc:chgData name="은석 이" userId="af18d81f-601b-4b8c-ae0d-605950137b83" providerId="ADAL" clId="{83A934BC-8347-447D-821F-274EB4778878}" dt="2022-03-08T23:44:51.980" v="53"/>
+        <pc:sldMkLst>
+          <pc:docMk/>
+          <pc:sldMk cId="4198410787" sldId="506"/>
+        </pc:sldMkLst>
       </pc:sldChg>
     </pc:docChg>
   </pc:docChgLst>
@@ -20078,7 +20078,7 @@
         </p:blipFill>
         <p:spPr>
           <a:xfrm>
-            <a:off x="1180701" y="631127"/>
+            <a:off x="975698" y="219670"/>
             <a:ext cx="10240603" cy="5044844"/>
           </a:xfrm>
           <a:prstGeom prst="rect">
@@ -20086,6 +20086,303 @@
           </a:prstGeom>
         </p:spPr>
       </p:pic>
+      <p:sp>
+        <p:nvSpPr>
+          <p:cNvPr id="6" name="TextBox 5">
+            <a:extLst>
+              <a:ext uri="{FF2B5EF4-FFF2-40B4-BE49-F238E27FC236}">
+                <a16:creationId xmlns:a16="http://schemas.microsoft.com/office/drawing/2014/main" id="{AB910053-E900-5B00-7B31-5B6481C3800A}"/>
+              </a:ext>
+            </a:extLst>
+          </p:cNvPr>
+          <p:cNvSpPr txBox="1"/>
+          <p:nvPr/>
+        </p:nvSpPr>
+        <p:spPr>
+          <a:xfrm>
+            <a:off x="54963" y="5264514"/>
+            <a:ext cx="12082072" cy="584775"/>
+          </a:xfrm>
+          <a:prstGeom prst="rect">
+            <a:avLst/>
+          </a:prstGeom>
+          <a:noFill/>
+        </p:spPr>
+        <p:txBody>
+          <a:bodyPr wrap="square">
+            <a:spAutoFit/>
+          </a:bodyPr>
+          <a:lstStyle/>
+          <a:p>
+            <a:r>
+              <a:rPr lang="en-US" altLang="ko-KR" sz="1600" b="0" i="0" kern="1200" dirty="0">
+                <a:solidFill>
+                  <a:schemeClr val="tx1"/>
+                </a:solidFill>
+                <a:effectLst/>
+                <a:latin typeface="+mn-lt"/>
+                <a:ea typeface="+mn-ea"/>
+                <a:cs typeface="+mn-cs"/>
+              </a:rPr>
+              <a:t>CI(Continuous Integration/ </a:t>
+            </a:r>
+            <a:r>
+              <a:rPr lang="ko-KR" altLang="en-US" sz="1600" b="0" i="0" kern="1200" dirty="0">
+                <a:solidFill>
+                  <a:schemeClr val="tx1"/>
+                </a:solidFill>
+                <a:effectLst/>
+                <a:latin typeface="+mn-lt"/>
+                <a:ea typeface="+mn-ea"/>
+                <a:cs typeface="+mn-cs"/>
+              </a:rPr>
+              <a:t>지속적 통합</a:t>
+            </a:r>
+            <a:r>
+              <a:rPr lang="en-US" altLang="ko-KR" sz="1600" b="0" i="0" kern="1200" dirty="0">
+                <a:solidFill>
+                  <a:schemeClr val="tx1"/>
+                </a:solidFill>
+                <a:effectLst/>
+                <a:latin typeface="+mn-lt"/>
+                <a:ea typeface="+mn-ea"/>
+                <a:cs typeface="+mn-cs"/>
+              </a:rPr>
+              <a:t>)</a:t>
+            </a:r>
+            <a:r>
+              <a:rPr lang="ko-KR" altLang="en-US" sz="1600" b="0" i="0" kern="1200" dirty="0">
+                <a:solidFill>
+                  <a:schemeClr val="tx1"/>
+                </a:solidFill>
+                <a:effectLst/>
+                <a:latin typeface="+mn-lt"/>
+                <a:ea typeface="+mn-ea"/>
+                <a:cs typeface="+mn-cs"/>
+              </a:rPr>
+              <a:t>는 다수의 개발자가 작성</a:t>
+            </a:r>
+            <a:r>
+              <a:rPr lang="en-US" altLang="ko-KR" sz="1600" b="0" i="0" kern="1200" dirty="0">
+                <a:solidFill>
+                  <a:schemeClr val="tx1"/>
+                </a:solidFill>
+                <a:effectLst/>
+                <a:latin typeface="+mn-lt"/>
+                <a:ea typeface="+mn-ea"/>
+                <a:cs typeface="+mn-cs"/>
+              </a:rPr>
+              <a:t>, </a:t>
+            </a:r>
+            <a:r>
+              <a:rPr lang="ko-KR" altLang="en-US" sz="1600" b="0" i="0" kern="1200" dirty="0">
+                <a:solidFill>
+                  <a:schemeClr val="tx1"/>
+                </a:solidFill>
+                <a:effectLst/>
+                <a:latin typeface="+mn-lt"/>
+                <a:ea typeface="+mn-ea"/>
+                <a:cs typeface="+mn-cs"/>
+              </a:rPr>
+              <a:t>수정한 소스코드를 지속적으로 통합</a:t>
+            </a:r>
+            <a:r>
+              <a:rPr lang="en-US" altLang="ko-KR" sz="1600" b="0" i="0" kern="1200" dirty="0">
+                <a:solidFill>
+                  <a:schemeClr val="tx1"/>
+                </a:solidFill>
+                <a:effectLst/>
+                <a:latin typeface="+mn-lt"/>
+                <a:ea typeface="+mn-ea"/>
+                <a:cs typeface="+mn-cs"/>
+              </a:rPr>
+              <a:t>/</a:t>
+            </a:r>
+            <a:r>
+              <a:rPr lang="ko-KR" altLang="en-US" sz="1600" b="0" i="0" kern="1200" dirty="0">
+                <a:solidFill>
+                  <a:schemeClr val="tx1"/>
+                </a:solidFill>
+                <a:effectLst/>
+                <a:latin typeface="+mn-lt"/>
+                <a:ea typeface="+mn-ea"/>
+                <a:cs typeface="+mn-cs"/>
+              </a:rPr>
+              <a:t>테스트하는 것을 의미한다</a:t>
+            </a:r>
+            <a:r>
+              <a:rPr lang="en-US" altLang="ko-KR" sz="1600" b="0" i="0" kern="1200" dirty="0">
+                <a:solidFill>
+                  <a:schemeClr val="tx1"/>
+                </a:solidFill>
+                <a:effectLst/>
+                <a:latin typeface="+mn-lt"/>
+                <a:ea typeface="+mn-ea"/>
+                <a:cs typeface="+mn-cs"/>
+              </a:rPr>
+              <a:t>.</a:t>
+            </a:r>
+          </a:p>
+          <a:p>
+            <a:r>
+              <a:rPr lang="en-US" altLang="ko-KR" sz="1600" b="0" i="0" kern="1200" dirty="0">
+                <a:solidFill>
+                  <a:schemeClr val="tx1"/>
+                </a:solidFill>
+                <a:effectLst/>
+                <a:latin typeface="+mn-lt"/>
+                <a:ea typeface="+mn-ea"/>
+                <a:cs typeface="+mn-cs"/>
+              </a:rPr>
+              <a:t>CD(Continuous Deployment / </a:t>
+            </a:r>
+            <a:r>
+              <a:rPr lang="ko-KR" altLang="en-US" sz="1600" b="0" i="0" kern="1200" dirty="0">
+                <a:solidFill>
+                  <a:schemeClr val="tx1"/>
+                </a:solidFill>
+                <a:effectLst/>
+                <a:latin typeface="+mn-lt"/>
+                <a:ea typeface="+mn-ea"/>
+                <a:cs typeface="+mn-cs"/>
+              </a:rPr>
+              <a:t>지속적 배포</a:t>
+            </a:r>
+            <a:r>
+              <a:rPr lang="en-US" altLang="ko-KR" sz="1600" b="0" i="0" kern="1200" dirty="0">
+                <a:solidFill>
+                  <a:schemeClr val="tx1"/>
+                </a:solidFill>
+                <a:effectLst/>
+                <a:latin typeface="+mn-lt"/>
+                <a:ea typeface="+mn-ea"/>
+                <a:cs typeface="+mn-cs"/>
+              </a:rPr>
+              <a:t>)</a:t>
+            </a:r>
+            <a:r>
+              <a:rPr lang="ko-KR" altLang="en-US" sz="1600" b="0" i="0" kern="1200" dirty="0">
+                <a:solidFill>
+                  <a:schemeClr val="tx1"/>
+                </a:solidFill>
+                <a:effectLst/>
+                <a:latin typeface="+mn-lt"/>
+                <a:ea typeface="+mn-ea"/>
+                <a:cs typeface="+mn-cs"/>
+              </a:rPr>
+              <a:t>는 개발</a:t>
+            </a:r>
+            <a:r>
+              <a:rPr lang="en-US" altLang="ko-KR" sz="1600" b="0" i="0" kern="1200" dirty="0">
+                <a:solidFill>
+                  <a:schemeClr val="tx1"/>
+                </a:solidFill>
+                <a:effectLst/>
+                <a:latin typeface="+mn-lt"/>
+                <a:ea typeface="+mn-ea"/>
+                <a:cs typeface="+mn-cs"/>
+              </a:rPr>
+              <a:t>, </a:t>
+            </a:r>
+            <a:r>
+              <a:rPr lang="ko-KR" altLang="en-US" sz="1600" b="0" i="0" kern="1200" dirty="0">
+                <a:solidFill>
+                  <a:schemeClr val="tx1"/>
+                </a:solidFill>
+                <a:effectLst/>
+                <a:latin typeface="+mn-lt"/>
+                <a:ea typeface="+mn-ea"/>
+                <a:cs typeface="+mn-cs"/>
+              </a:rPr>
+              <a:t>통합</a:t>
+            </a:r>
+            <a:r>
+              <a:rPr lang="en-US" altLang="ko-KR" sz="1600" b="0" i="0" kern="1200" dirty="0">
+                <a:solidFill>
+                  <a:schemeClr val="tx1"/>
+                </a:solidFill>
+                <a:effectLst/>
+                <a:latin typeface="+mn-lt"/>
+                <a:ea typeface="+mn-ea"/>
+                <a:cs typeface="+mn-cs"/>
+              </a:rPr>
+              <a:t>, </a:t>
+            </a:r>
+            <a:r>
+              <a:rPr lang="ko-KR" altLang="en-US" sz="1600" b="0" i="0" kern="1200" dirty="0">
+                <a:solidFill>
+                  <a:schemeClr val="tx1"/>
+                </a:solidFill>
+                <a:effectLst/>
+                <a:latin typeface="+mn-lt"/>
+                <a:ea typeface="+mn-ea"/>
+                <a:cs typeface="+mn-cs"/>
+              </a:rPr>
+              <a:t>배포</a:t>
+            </a:r>
+            <a:r>
+              <a:rPr lang="en-US" altLang="ko-KR" sz="1600" b="0" i="0" kern="1200" dirty="0">
+                <a:solidFill>
+                  <a:schemeClr val="tx1"/>
+                </a:solidFill>
+                <a:effectLst/>
+                <a:latin typeface="+mn-lt"/>
+                <a:ea typeface="+mn-ea"/>
+                <a:cs typeface="+mn-cs"/>
+              </a:rPr>
+              <a:t>, </a:t>
+            </a:r>
+            <a:r>
+              <a:rPr lang="ko-KR" altLang="en-US" sz="1600" b="0" i="0" kern="1200" dirty="0">
+                <a:solidFill>
+                  <a:schemeClr val="tx1"/>
+                </a:solidFill>
+                <a:effectLst/>
+                <a:latin typeface="+mn-lt"/>
+                <a:ea typeface="+mn-ea"/>
+                <a:cs typeface="+mn-cs"/>
+              </a:rPr>
+              <a:t>릴리즈</a:t>
+            </a:r>
+            <a:r>
+              <a:rPr lang="en-US" altLang="ko-KR" sz="1600" b="0" i="0" kern="1200" dirty="0">
+                <a:solidFill>
+                  <a:schemeClr val="tx1"/>
+                </a:solidFill>
+                <a:effectLst/>
+                <a:latin typeface="+mn-lt"/>
+                <a:ea typeface="+mn-ea"/>
+                <a:cs typeface="+mn-cs"/>
+              </a:rPr>
+              <a:t>, </a:t>
+            </a:r>
+            <a:r>
+              <a:rPr lang="ko-KR" altLang="en-US" sz="1600" b="0" i="0" kern="1200" dirty="0">
+                <a:solidFill>
+                  <a:schemeClr val="tx1"/>
+                </a:solidFill>
+                <a:effectLst/>
+                <a:latin typeface="+mn-lt"/>
+                <a:ea typeface="+mn-ea"/>
+                <a:cs typeface="+mn-cs"/>
+              </a:rPr>
+              <a:t>테스트를 자동화하여 지속적으로 배포하는 것을 의미한다</a:t>
+            </a:r>
+            <a:r>
+              <a:rPr lang="en-US" altLang="ko-KR" sz="1600" b="0" i="0" kern="1200" dirty="0">
+                <a:solidFill>
+                  <a:schemeClr val="tx1"/>
+                </a:solidFill>
+                <a:effectLst/>
+                <a:latin typeface="+mn-lt"/>
+                <a:ea typeface="+mn-ea"/>
+                <a:cs typeface="+mn-cs"/>
+              </a:rPr>
+              <a:t>.</a:t>
+            </a:r>
+          </a:p>
+        </p:txBody>
+      </p:sp>
     </p:spTree>
     <p:extLst>
       <p:ext uri="{BB962C8B-B14F-4D97-AF65-F5344CB8AC3E}">

</xml_diff>